<commit_message>
added hazard block and event and 3rd world
</commit_message>
<xml_diff>
--- a/resources/spriteMaker.pptx
+++ b/resources/spriteMaker.pptx
@@ -104,6 +104,11 @@
       </a:defRPr>
     </a:lvl9pPr>
   </p:defaultTextStyle>
+  <p:extLst>
+    <p:ext uri="{EFAFB233-063F-42B5-8137-9DF3F51BA10A}">
+      <p15:sldGuideLst xmlns:p15="http://schemas.microsoft.com/office/powerpoint/2012/main"/>
+    </p:ext>
+  </p:extLst>
 </p:presentation>
 </file>
 
@@ -236,7 +241,7 @@
           <a:p>
             <a:fld id="{8B036269-5A58-45BA-8565-7407D9AFB412}" type="datetimeFigureOut">
               <a:rPr lang="en-US" smtClean="0"/>
-              <a:t>4/10/2017</a:t>
+              <a:t>4/12/2017</a:t>
             </a:fld>
             <a:endParaRPr lang="en-US"/>
           </a:p>
@@ -404,7 +409,7 @@
           <a:p>
             <a:fld id="{8B036269-5A58-45BA-8565-7407D9AFB412}" type="datetimeFigureOut">
               <a:rPr lang="en-US" smtClean="0"/>
-              <a:t>4/10/2017</a:t>
+              <a:t>4/12/2017</a:t>
             </a:fld>
             <a:endParaRPr lang="en-US"/>
           </a:p>
@@ -582,7 +587,7 @@
           <a:p>
             <a:fld id="{8B036269-5A58-45BA-8565-7407D9AFB412}" type="datetimeFigureOut">
               <a:rPr lang="en-US" smtClean="0"/>
-              <a:t>4/10/2017</a:t>
+              <a:t>4/12/2017</a:t>
             </a:fld>
             <a:endParaRPr lang="en-US"/>
           </a:p>
@@ -750,7 +755,7 @@
           <a:p>
             <a:fld id="{8B036269-5A58-45BA-8565-7407D9AFB412}" type="datetimeFigureOut">
               <a:rPr lang="en-US" smtClean="0"/>
-              <a:t>4/10/2017</a:t>
+              <a:t>4/12/2017</a:t>
             </a:fld>
             <a:endParaRPr lang="en-US"/>
           </a:p>
@@ -995,7 +1000,7 @@
           <a:p>
             <a:fld id="{8B036269-5A58-45BA-8565-7407D9AFB412}" type="datetimeFigureOut">
               <a:rPr lang="en-US" smtClean="0"/>
-              <a:t>4/10/2017</a:t>
+              <a:t>4/12/2017</a:t>
             </a:fld>
             <a:endParaRPr lang="en-US"/>
           </a:p>
@@ -1224,7 +1229,7 @@
           <a:p>
             <a:fld id="{8B036269-5A58-45BA-8565-7407D9AFB412}" type="datetimeFigureOut">
               <a:rPr lang="en-US" smtClean="0"/>
-              <a:t>4/10/2017</a:t>
+              <a:t>4/12/2017</a:t>
             </a:fld>
             <a:endParaRPr lang="en-US"/>
           </a:p>
@@ -1588,7 +1593,7 @@
           <a:p>
             <a:fld id="{8B036269-5A58-45BA-8565-7407D9AFB412}" type="datetimeFigureOut">
               <a:rPr lang="en-US" smtClean="0"/>
-              <a:t>4/10/2017</a:t>
+              <a:t>4/12/2017</a:t>
             </a:fld>
             <a:endParaRPr lang="en-US"/>
           </a:p>
@@ -1705,7 +1710,7 @@
           <a:p>
             <a:fld id="{8B036269-5A58-45BA-8565-7407D9AFB412}" type="datetimeFigureOut">
               <a:rPr lang="en-US" smtClean="0"/>
-              <a:t>4/10/2017</a:t>
+              <a:t>4/12/2017</a:t>
             </a:fld>
             <a:endParaRPr lang="en-US"/>
           </a:p>
@@ -1800,7 +1805,7 @@
           <a:p>
             <a:fld id="{8B036269-5A58-45BA-8565-7407D9AFB412}" type="datetimeFigureOut">
               <a:rPr lang="en-US" smtClean="0"/>
-              <a:t>4/10/2017</a:t>
+              <a:t>4/12/2017</a:t>
             </a:fld>
             <a:endParaRPr lang="en-US"/>
           </a:p>
@@ -2075,7 +2080,7 @@
           <a:p>
             <a:fld id="{8B036269-5A58-45BA-8565-7407D9AFB412}" type="datetimeFigureOut">
               <a:rPr lang="en-US" smtClean="0"/>
-              <a:t>4/10/2017</a:t>
+              <a:t>4/12/2017</a:t>
             </a:fld>
             <a:endParaRPr lang="en-US"/>
           </a:p>
@@ -2327,7 +2332,7 @@
           <a:p>
             <a:fld id="{8B036269-5A58-45BA-8565-7407D9AFB412}" type="datetimeFigureOut">
               <a:rPr lang="en-US" smtClean="0"/>
-              <a:t>4/10/2017</a:t>
+              <a:t>4/12/2017</a:t>
             </a:fld>
             <a:endParaRPr lang="en-US"/>
           </a:p>
@@ -2538,7 +2543,7 @@
           <a:p>
             <a:fld id="{8B036269-5A58-45BA-8565-7407D9AFB412}" type="datetimeFigureOut">
               <a:rPr lang="en-US" smtClean="0"/>
-              <a:t>4/10/2017</a:t>
+              <a:t>4/12/2017</a:t>
             </a:fld>
             <a:endParaRPr lang="en-US"/>
           </a:p>
@@ -2965,7 +2970,7 @@
         </p:blipFill>
         <p:spPr>
           <a:xfrm>
-            <a:off x="4310498" y="1373603"/>
+            <a:off x="493058" y="1051010"/>
             <a:ext cx="1905266" cy="285790"/>
           </a:xfrm>
           <a:prstGeom prst="rect">
@@ -2981,7 +2986,7 @@
         </p:nvSpPr>
         <p:spPr>
           <a:xfrm>
-            <a:off x="493059" y="2043953"/>
+            <a:off x="493058" y="215153"/>
             <a:ext cx="11600329" cy="439271"/>
           </a:xfrm>
           <a:prstGeom prst="roundRect">
@@ -3032,7 +3037,7 @@
         </p:nvSpPr>
         <p:spPr>
           <a:xfrm>
-            <a:off x="2541070" y="4456496"/>
+            <a:off x="3365391" y="2780096"/>
             <a:ext cx="901296" cy="1241659"/>
           </a:xfrm>
           <a:prstGeom prst="rect">
@@ -3094,7 +3099,7 @@
         </p:blipFill>
         <p:spPr>
           <a:xfrm>
-            <a:off x="6102723" y="4577262"/>
+            <a:off x="3366246" y="4720697"/>
             <a:ext cx="381000" cy="1000125"/>
           </a:xfrm>
           <a:prstGeom prst="rect">
@@ -3110,7 +3115,7 @@
         </p:nvGrpSpPr>
         <p:grpSpPr>
           <a:xfrm>
-            <a:off x="5609924" y="2540553"/>
+            <a:off x="3261171" y="867475"/>
             <a:ext cx="972151" cy="1460027"/>
             <a:chOff x="5609924" y="2540553"/>
             <a:chExt cx="972151" cy="1460027"/>
@@ -3185,7 +3190,7 @@
         </p:nvGrpSpPr>
         <p:grpSpPr>
           <a:xfrm>
-            <a:off x="7080985" y="2540553"/>
+            <a:off x="4472256" y="867475"/>
             <a:ext cx="972151" cy="1460027"/>
             <a:chOff x="5609924" y="2540553"/>
             <a:chExt cx="972151" cy="1460027"/>
@@ -3252,6 +3257,245 @@
           </p:txBody>
         </p:sp>
       </p:grpSp>
+      <p:grpSp>
+        <p:nvGrpSpPr>
+          <p:cNvPr id="17" name="Group 16"/>
+          <p:cNvGrpSpPr/>
+          <p:nvPr/>
+        </p:nvGrpSpPr>
+        <p:grpSpPr>
+          <a:xfrm>
+            <a:off x="5678592" y="867475"/>
+            <a:ext cx="972151" cy="1460027"/>
+            <a:chOff x="5609924" y="2540553"/>
+            <a:chExt cx="972151" cy="1460027"/>
+          </a:xfrm>
+        </p:grpSpPr>
+        <p:pic>
+          <p:nvPicPr>
+            <p:cNvPr id="18" name="Picture 17"/>
+            <p:cNvPicPr>
+              <a:picLocks noChangeAspect="1"/>
+            </p:cNvPicPr>
+            <p:nvPr/>
+          </p:nvPicPr>
+          <p:blipFill>
+            <a:blip r:embed="rId4">
+              <a:extLst>
+                <a:ext uri="{28A0092B-C50C-407E-A947-70E740481C1C}">
+                  <a14:useLocalDpi xmlns:a14="http://schemas.microsoft.com/office/drawing/2010/main" val="0"/>
+                </a:ext>
+              </a:extLst>
+            </a:blip>
+            <a:stretch>
+              <a:fillRect/>
+            </a:stretch>
+          </p:blipFill>
+          <p:spPr>
+            <a:xfrm>
+              <a:off x="5714947" y="2857420"/>
+              <a:ext cx="762106" cy="1143160"/>
+            </a:xfrm>
+            <a:prstGeom prst="rect">
+              <a:avLst/>
+            </a:prstGeom>
+          </p:spPr>
+        </p:pic>
+        <p:sp>
+          <p:nvSpPr>
+            <p:cNvPr id="19" name="TextBox 18"/>
+            <p:cNvSpPr txBox="1"/>
+            <p:nvPr/>
+          </p:nvSpPr>
+          <p:spPr>
+            <a:xfrm>
+              <a:off x="5609924" y="2540553"/>
+              <a:ext cx="972151" cy="375385"/>
+            </a:xfrm>
+            <a:prstGeom prst="rect">
+              <a:avLst/>
+            </a:prstGeom>
+            <a:noFill/>
+          </p:spPr>
+          <p:txBody>
+            <a:bodyPr wrap="square" rtlCol="0">
+              <a:spAutoFit/>
+            </a:bodyPr>
+            <a:lstStyle/>
+            <a:p>
+              <a:pPr algn="ctr"/>
+              <a:r>
+                <a:rPr lang="en-US" dirty="0" err="1"/>
+                <a:t>Lvl</a:t>
+              </a:r>
+              <a:r>
+                <a:rPr lang="en-US" dirty="0"/>
+                <a:t> 03</a:t>
+              </a:r>
+            </a:p>
+          </p:txBody>
+        </p:sp>
+      </p:grpSp>
+      <p:grpSp>
+        <p:nvGrpSpPr>
+          <p:cNvPr id="20" name="Group 19"/>
+          <p:cNvGrpSpPr/>
+          <p:nvPr/>
+        </p:nvGrpSpPr>
+        <p:grpSpPr>
+          <a:xfrm>
+            <a:off x="6889677" y="867475"/>
+            <a:ext cx="972151" cy="1460027"/>
+            <a:chOff x="5609924" y="2540553"/>
+            <a:chExt cx="972151" cy="1460027"/>
+          </a:xfrm>
+        </p:grpSpPr>
+        <p:pic>
+          <p:nvPicPr>
+            <p:cNvPr id="21" name="Picture 20"/>
+            <p:cNvPicPr>
+              <a:picLocks noChangeAspect="1"/>
+            </p:cNvPicPr>
+            <p:nvPr/>
+          </p:nvPicPr>
+          <p:blipFill>
+            <a:blip r:embed="rId4">
+              <a:extLst>
+                <a:ext uri="{28A0092B-C50C-407E-A947-70E740481C1C}">
+                  <a14:useLocalDpi xmlns:a14="http://schemas.microsoft.com/office/drawing/2010/main" val="0"/>
+                </a:ext>
+              </a:extLst>
+            </a:blip>
+            <a:stretch>
+              <a:fillRect/>
+            </a:stretch>
+          </p:blipFill>
+          <p:spPr>
+            <a:xfrm>
+              <a:off x="5714947" y="2857420"/>
+              <a:ext cx="762106" cy="1143160"/>
+            </a:xfrm>
+            <a:prstGeom prst="rect">
+              <a:avLst/>
+            </a:prstGeom>
+          </p:spPr>
+        </p:pic>
+        <p:sp>
+          <p:nvSpPr>
+            <p:cNvPr id="22" name="TextBox 21"/>
+            <p:cNvSpPr txBox="1"/>
+            <p:nvPr/>
+          </p:nvSpPr>
+          <p:spPr>
+            <a:xfrm>
+              <a:off x="5609924" y="2540553"/>
+              <a:ext cx="972151" cy="375385"/>
+            </a:xfrm>
+            <a:prstGeom prst="rect">
+              <a:avLst/>
+            </a:prstGeom>
+            <a:noFill/>
+          </p:spPr>
+          <p:txBody>
+            <a:bodyPr wrap="square" rtlCol="0">
+              <a:spAutoFit/>
+            </a:bodyPr>
+            <a:lstStyle/>
+            <a:p>
+              <a:pPr algn="ctr"/>
+              <a:r>
+                <a:rPr lang="en-US" dirty="0" err="1"/>
+                <a:t>Lvl</a:t>
+              </a:r>
+              <a:r>
+                <a:rPr lang="en-US" dirty="0"/>
+                <a:t> 04</a:t>
+              </a:r>
+            </a:p>
+          </p:txBody>
+        </p:sp>
+      </p:grpSp>
+      <p:pic>
+        <p:nvPicPr>
+          <p:cNvPr id="3" name="Picture 2"/>
+          <p:cNvPicPr>
+            <a:picLocks noChangeAspect="1"/>
+          </p:cNvPicPr>
+          <p:nvPr/>
+        </p:nvPicPr>
+        <p:blipFill>
+          <a:blip r:embed="rId5">
+            <a:extLst>
+              <a:ext uri="{28A0092B-C50C-407E-A947-70E740481C1C}">
+                <a14:useLocalDpi xmlns:a14="http://schemas.microsoft.com/office/drawing/2010/main" val="0"/>
+              </a:ext>
+            </a:extLst>
+          </a:blip>
+          <a:stretch>
+            <a:fillRect/>
+          </a:stretch>
+        </p:blipFill>
+        <p:spPr>
+          <a:xfrm>
+            <a:off x="7504590" y="3071762"/>
+            <a:ext cx="714475" cy="714475"/>
+          </a:xfrm>
+          <a:prstGeom prst="rect">
+            <a:avLst/>
+          </a:prstGeom>
+        </p:spPr>
+      </p:pic>
+      <p:sp>
+        <p:nvSpPr>
+          <p:cNvPr id="4" name="Rectangle: Rounded Corners 3"/>
+          <p:cNvSpPr/>
+          <p:nvPr/>
+        </p:nvSpPr>
+        <p:spPr>
+          <a:xfrm>
+            <a:off x="6650743" y="3071762"/>
+            <a:ext cx="693333" cy="693333"/>
+          </a:xfrm>
+          <a:prstGeom prst="roundRect">
+            <a:avLst/>
+          </a:prstGeom>
+          <a:solidFill>
+            <a:schemeClr val="tx1">
+              <a:lumMod val="75000"/>
+              <a:lumOff val="25000"/>
+            </a:schemeClr>
+          </a:solidFill>
+          <a:ln w="25400">
+            <a:solidFill>
+              <a:srgbClr val="C00000"/>
+            </a:solidFill>
+          </a:ln>
+        </p:spPr>
+        <p:style>
+          <a:lnRef idx="2">
+            <a:schemeClr val="accent1">
+              <a:shade val="50000"/>
+            </a:schemeClr>
+          </a:lnRef>
+          <a:fillRef idx="1">
+            <a:schemeClr val="accent1"/>
+          </a:fillRef>
+          <a:effectRef idx="0">
+            <a:schemeClr val="accent1"/>
+          </a:effectRef>
+          <a:fontRef idx="minor">
+            <a:schemeClr val="lt1"/>
+          </a:fontRef>
+        </p:style>
+        <p:txBody>
+          <a:bodyPr rtlCol="0" anchor="ctr"/>
+          <a:lstStyle/>
+          <a:p>
+            <a:pPr algn="ctr"/>
+            <a:endParaRPr lang="en-US"/>
+          </a:p>
+        </p:txBody>
+      </p:sp>
     </p:spTree>
     <p:extLst>
       <p:ext uri="{BB962C8B-B14F-4D97-AF65-F5344CB8AC3E}">

</xml_diff>

<commit_message>
finalizing beta map level
</commit_message>
<xml_diff>
--- a/resources/spriteMaker.pptx
+++ b/resources/spriteMaker.pptx
@@ -241,7 +241,7 @@
           <a:p>
             <a:fld id="{8B036269-5A58-45BA-8565-7407D9AFB412}" type="datetimeFigureOut">
               <a:rPr lang="en-US" smtClean="0"/>
-              <a:t>4/19/2017</a:t>
+              <a:t>4/24/2017</a:t>
             </a:fld>
             <a:endParaRPr lang="en-US"/>
           </a:p>
@@ -409,7 +409,7 @@
           <a:p>
             <a:fld id="{8B036269-5A58-45BA-8565-7407D9AFB412}" type="datetimeFigureOut">
               <a:rPr lang="en-US" smtClean="0"/>
-              <a:t>4/19/2017</a:t>
+              <a:t>4/24/2017</a:t>
             </a:fld>
             <a:endParaRPr lang="en-US"/>
           </a:p>
@@ -587,7 +587,7 @@
           <a:p>
             <a:fld id="{8B036269-5A58-45BA-8565-7407D9AFB412}" type="datetimeFigureOut">
               <a:rPr lang="en-US" smtClean="0"/>
-              <a:t>4/19/2017</a:t>
+              <a:t>4/24/2017</a:t>
             </a:fld>
             <a:endParaRPr lang="en-US"/>
           </a:p>
@@ -755,7 +755,7 @@
           <a:p>
             <a:fld id="{8B036269-5A58-45BA-8565-7407D9AFB412}" type="datetimeFigureOut">
               <a:rPr lang="en-US" smtClean="0"/>
-              <a:t>4/19/2017</a:t>
+              <a:t>4/24/2017</a:t>
             </a:fld>
             <a:endParaRPr lang="en-US"/>
           </a:p>
@@ -1000,7 +1000,7 @@
           <a:p>
             <a:fld id="{8B036269-5A58-45BA-8565-7407D9AFB412}" type="datetimeFigureOut">
               <a:rPr lang="en-US" smtClean="0"/>
-              <a:t>4/19/2017</a:t>
+              <a:t>4/24/2017</a:t>
             </a:fld>
             <a:endParaRPr lang="en-US"/>
           </a:p>
@@ -1229,7 +1229,7 @@
           <a:p>
             <a:fld id="{8B036269-5A58-45BA-8565-7407D9AFB412}" type="datetimeFigureOut">
               <a:rPr lang="en-US" smtClean="0"/>
-              <a:t>4/19/2017</a:t>
+              <a:t>4/24/2017</a:t>
             </a:fld>
             <a:endParaRPr lang="en-US"/>
           </a:p>
@@ -1593,7 +1593,7 @@
           <a:p>
             <a:fld id="{8B036269-5A58-45BA-8565-7407D9AFB412}" type="datetimeFigureOut">
               <a:rPr lang="en-US" smtClean="0"/>
-              <a:t>4/19/2017</a:t>
+              <a:t>4/24/2017</a:t>
             </a:fld>
             <a:endParaRPr lang="en-US"/>
           </a:p>
@@ -1710,7 +1710,7 @@
           <a:p>
             <a:fld id="{8B036269-5A58-45BA-8565-7407D9AFB412}" type="datetimeFigureOut">
               <a:rPr lang="en-US" smtClean="0"/>
-              <a:t>4/19/2017</a:t>
+              <a:t>4/24/2017</a:t>
             </a:fld>
             <a:endParaRPr lang="en-US"/>
           </a:p>
@@ -1805,7 +1805,7 @@
           <a:p>
             <a:fld id="{8B036269-5A58-45BA-8565-7407D9AFB412}" type="datetimeFigureOut">
               <a:rPr lang="en-US" smtClean="0"/>
-              <a:t>4/19/2017</a:t>
+              <a:t>4/24/2017</a:t>
             </a:fld>
             <a:endParaRPr lang="en-US"/>
           </a:p>
@@ -2080,7 +2080,7 @@
           <a:p>
             <a:fld id="{8B036269-5A58-45BA-8565-7407D9AFB412}" type="datetimeFigureOut">
               <a:rPr lang="en-US" smtClean="0"/>
-              <a:t>4/19/2017</a:t>
+              <a:t>4/24/2017</a:t>
             </a:fld>
             <a:endParaRPr lang="en-US"/>
           </a:p>
@@ -2332,7 +2332,7 @@
           <a:p>
             <a:fld id="{8B036269-5A58-45BA-8565-7407D9AFB412}" type="datetimeFigureOut">
               <a:rPr lang="en-US" smtClean="0"/>
-              <a:t>4/19/2017</a:t>
+              <a:t>4/24/2017</a:t>
             </a:fld>
             <a:endParaRPr lang="en-US"/>
           </a:p>
@@ -2543,7 +2543,7 @@
           <a:p>
             <a:fld id="{8B036269-5A58-45BA-8565-7407D9AFB412}" type="datetimeFigureOut">
               <a:rPr lang="en-US" smtClean="0"/>
-              <a:t>4/19/2017</a:t>
+              <a:t>4/24/2017</a:t>
             </a:fld>
             <a:endParaRPr lang="en-US"/>
           </a:p>
@@ -3504,7 +3504,7 @@
         </p:nvGrpSpPr>
         <p:grpSpPr>
           <a:xfrm>
-            <a:off x="7848901" y="867471"/>
+            <a:off x="7907876" y="875271"/>
             <a:ext cx="972151" cy="1460027"/>
             <a:chOff x="5609924" y="2540553"/>
             <a:chExt cx="972151" cy="1460027"/>
@@ -3650,6 +3650,457 @@
                 <a:rPr lang="en-US" dirty="0"/>
                 <a:t> 06</a:t>
               </a:r>
+            </a:p>
+          </p:txBody>
+        </p:sp>
+      </p:grpSp>
+      <p:sp>
+        <p:nvSpPr>
+          <p:cNvPr id="10" name="Rectangle: Rounded Corners 9"/>
+          <p:cNvSpPr/>
+          <p:nvPr/>
+        </p:nvSpPr>
+        <p:spPr>
+          <a:xfrm>
+            <a:off x="5485588" y="3633837"/>
+            <a:ext cx="266700" cy="304800"/>
+          </a:xfrm>
+          <a:prstGeom prst="roundRect">
+            <a:avLst/>
+          </a:prstGeom>
+          <a:solidFill>
+            <a:schemeClr val="accent6">
+              <a:lumMod val="60000"/>
+              <a:lumOff val="40000"/>
+            </a:schemeClr>
+          </a:solidFill>
+          <a:ln w="28575">
+            <a:solidFill>
+              <a:srgbClr val="00B050"/>
+            </a:solidFill>
+          </a:ln>
+        </p:spPr>
+        <p:style>
+          <a:lnRef idx="2">
+            <a:schemeClr val="accent1">
+              <a:shade val="50000"/>
+            </a:schemeClr>
+          </a:lnRef>
+          <a:fillRef idx="1">
+            <a:schemeClr val="accent1"/>
+          </a:fillRef>
+          <a:effectRef idx="0">
+            <a:schemeClr val="accent1"/>
+          </a:effectRef>
+          <a:fontRef idx="minor">
+            <a:schemeClr val="lt1"/>
+          </a:fontRef>
+        </p:style>
+        <p:txBody>
+          <a:bodyPr rtlCol="0" anchor="ctr"/>
+          <a:lstStyle/>
+          <a:p>
+            <a:pPr algn="ctr"/>
+            <a:endParaRPr lang="en-US"/>
+          </a:p>
+        </p:txBody>
+      </p:sp>
+      <p:sp>
+        <p:nvSpPr>
+          <p:cNvPr id="31" name="Rectangle: Rounded Corners 30"/>
+          <p:cNvSpPr/>
+          <p:nvPr/>
+        </p:nvSpPr>
+        <p:spPr>
+          <a:xfrm>
+            <a:off x="6018317" y="3795762"/>
+            <a:ext cx="266700" cy="142875"/>
+          </a:xfrm>
+          <a:prstGeom prst="roundRect">
+            <a:avLst/>
+          </a:prstGeom>
+          <a:solidFill>
+            <a:schemeClr val="accent6">
+              <a:lumMod val="60000"/>
+              <a:lumOff val="40000"/>
+            </a:schemeClr>
+          </a:solidFill>
+          <a:ln w="28575">
+            <a:solidFill>
+              <a:srgbClr val="00B050"/>
+            </a:solidFill>
+          </a:ln>
+        </p:spPr>
+        <p:style>
+          <a:lnRef idx="2">
+            <a:schemeClr val="accent1">
+              <a:shade val="50000"/>
+            </a:schemeClr>
+          </a:lnRef>
+          <a:fillRef idx="1">
+            <a:schemeClr val="accent1"/>
+          </a:fillRef>
+          <a:effectRef idx="0">
+            <a:schemeClr val="accent1"/>
+          </a:effectRef>
+          <a:fontRef idx="minor">
+            <a:schemeClr val="lt1"/>
+          </a:fontRef>
+        </p:style>
+        <p:txBody>
+          <a:bodyPr rtlCol="0" anchor="ctr"/>
+          <a:lstStyle/>
+          <a:p>
+            <a:pPr algn="ctr"/>
+            <a:endParaRPr lang="en-US"/>
+          </a:p>
+        </p:txBody>
+      </p:sp>
+      <p:grpSp>
+        <p:nvGrpSpPr>
+          <p:cNvPr id="33" name="Group 32"/>
+          <p:cNvGrpSpPr/>
+          <p:nvPr/>
+        </p:nvGrpSpPr>
+        <p:grpSpPr>
+          <a:xfrm>
+            <a:off x="895338" y="3524349"/>
+            <a:ext cx="972151" cy="1460027"/>
+            <a:chOff x="5609924" y="2540553"/>
+            <a:chExt cx="972151" cy="1460027"/>
+          </a:xfrm>
+        </p:grpSpPr>
+        <p:pic>
+          <p:nvPicPr>
+            <p:cNvPr id="34" name="Picture 33"/>
+            <p:cNvPicPr>
+              <a:picLocks noChangeAspect="1"/>
+            </p:cNvPicPr>
+            <p:nvPr/>
+          </p:nvPicPr>
+          <p:blipFill>
+            <a:blip r:embed="rId4">
+              <a:extLst>
+                <a:ext uri="{28A0092B-C50C-407E-A947-70E740481C1C}">
+                  <a14:useLocalDpi xmlns:a14="http://schemas.microsoft.com/office/drawing/2010/main" val="0"/>
+                </a:ext>
+              </a:extLst>
+            </a:blip>
+            <a:stretch>
+              <a:fillRect/>
+            </a:stretch>
+          </p:blipFill>
+          <p:spPr>
+            <a:xfrm>
+              <a:off x="5714947" y="2857420"/>
+              <a:ext cx="762106" cy="1143160"/>
+            </a:xfrm>
+            <a:prstGeom prst="rect">
+              <a:avLst/>
+            </a:prstGeom>
+          </p:spPr>
+        </p:pic>
+        <p:sp>
+          <p:nvSpPr>
+            <p:cNvPr id="35" name="TextBox 34"/>
+            <p:cNvSpPr txBox="1"/>
+            <p:nvPr/>
+          </p:nvSpPr>
+          <p:spPr>
+            <a:xfrm>
+              <a:off x="5609924" y="2540553"/>
+              <a:ext cx="972151" cy="375385"/>
+            </a:xfrm>
+            <a:prstGeom prst="rect">
+              <a:avLst/>
+            </a:prstGeom>
+            <a:noFill/>
+          </p:spPr>
+          <p:txBody>
+            <a:bodyPr wrap="square" rtlCol="0">
+              <a:spAutoFit/>
+            </a:bodyPr>
+            <a:lstStyle/>
+            <a:p>
+              <a:pPr algn="ctr"/>
+              <a:r>
+                <a:rPr lang="en-US" dirty="0" err="1"/>
+                <a:t>Lvl</a:t>
+              </a:r>
+              <a:r>
+                <a:rPr lang="en-US" dirty="0"/>
+                <a:t> 06</a:t>
+              </a:r>
+            </a:p>
+          </p:txBody>
+        </p:sp>
+      </p:grpSp>
+      <p:grpSp>
+        <p:nvGrpSpPr>
+          <p:cNvPr id="40" name="Group 39"/>
+          <p:cNvGrpSpPr/>
+          <p:nvPr/>
+        </p:nvGrpSpPr>
+        <p:grpSpPr>
+          <a:xfrm>
+            <a:off x="8509363" y="2981214"/>
+            <a:ext cx="1805574" cy="1720004"/>
+            <a:chOff x="364503" y="3282269"/>
+            <a:chExt cx="2059698" cy="1962084"/>
+          </a:xfrm>
+        </p:grpSpPr>
+        <p:sp>
+          <p:nvSpPr>
+            <p:cNvPr id="32" name="Rectangle: Rounded Corners 31"/>
+            <p:cNvSpPr/>
+            <p:nvPr/>
+          </p:nvSpPr>
+          <p:spPr>
+            <a:xfrm>
+              <a:off x="364503" y="4984376"/>
+              <a:ext cx="2033822" cy="259977"/>
+            </a:xfrm>
+            <a:prstGeom prst="roundRect">
+              <a:avLst/>
+            </a:prstGeom>
+            <a:solidFill>
+              <a:schemeClr val="tx1">
+                <a:lumMod val="75000"/>
+                <a:lumOff val="25000"/>
+              </a:schemeClr>
+            </a:solidFill>
+            <a:ln w="31750">
+              <a:solidFill>
+                <a:srgbClr val="00B050"/>
+              </a:solidFill>
+            </a:ln>
+          </p:spPr>
+          <p:style>
+            <a:lnRef idx="2">
+              <a:schemeClr val="accent1">
+                <a:shade val="50000"/>
+              </a:schemeClr>
+            </a:lnRef>
+            <a:fillRef idx="1">
+              <a:schemeClr val="accent1"/>
+            </a:fillRef>
+            <a:effectRef idx="0">
+              <a:schemeClr val="accent1"/>
+            </a:effectRef>
+            <a:fontRef idx="minor">
+              <a:schemeClr val="lt1"/>
+            </a:fontRef>
+          </p:style>
+          <p:txBody>
+            <a:bodyPr rtlCol="0" anchor="ctr"/>
+            <a:lstStyle/>
+            <a:p>
+              <a:pPr algn="ctr"/>
+              <a:endParaRPr lang="en-US"/>
+            </a:p>
+          </p:txBody>
+        </p:sp>
+        <p:sp>
+          <p:nvSpPr>
+            <p:cNvPr id="36" name="Rectangle: Rounded Corners 35"/>
+            <p:cNvSpPr/>
+            <p:nvPr/>
+          </p:nvSpPr>
+          <p:spPr>
+            <a:xfrm rot="5400000">
+              <a:off x="-184122" y="4120655"/>
+              <a:ext cx="1431197" cy="296243"/>
+            </a:xfrm>
+            <a:prstGeom prst="roundRect">
+              <a:avLst/>
+            </a:prstGeom>
+            <a:solidFill>
+              <a:schemeClr val="tx1">
+                <a:lumMod val="75000"/>
+                <a:lumOff val="25000"/>
+              </a:schemeClr>
+            </a:solidFill>
+            <a:ln w="31750">
+              <a:solidFill>
+                <a:srgbClr val="00B050"/>
+              </a:solidFill>
+            </a:ln>
+          </p:spPr>
+          <p:style>
+            <a:lnRef idx="2">
+              <a:schemeClr val="accent1">
+                <a:shade val="50000"/>
+              </a:schemeClr>
+            </a:lnRef>
+            <a:fillRef idx="1">
+              <a:schemeClr val="accent1"/>
+            </a:fillRef>
+            <a:effectRef idx="0">
+              <a:schemeClr val="accent1"/>
+            </a:effectRef>
+            <a:fontRef idx="minor">
+              <a:schemeClr val="lt1"/>
+            </a:fontRef>
+          </p:style>
+          <p:txBody>
+            <a:bodyPr rtlCol="0" anchor="ctr"/>
+            <a:lstStyle/>
+            <a:p>
+              <a:pPr algn="ctr"/>
+              <a:endParaRPr lang="en-US"/>
+            </a:p>
+          </p:txBody>
+        </p:sp>
+        <p:sp>
+          <p:nvSpPr>
+            <p:cNvPr id="37" name="Rectangle: Rounded Corners 36"/>
+            <p:cNvSpPr/>
+            <p:nvPr/>
+          </p:nvSpPr>
+          <p:spPr>
+            <a:xfrm rot="5400000">
+              <a:off x="1534604" y="4120656"/>
+              <a:ext cx="1431197" cy="296243"/>
+            </a:xfrm>
+            <a:prstGeom prst="roundRect">
+              <a:avLst/>
+            </a:prstGeom>
+            <a:solidFill>
+              <a:schemeClr val="tx1">
+                <a:lumMod val="75000"/>
+                <a:lumOff val="25000"/>
+              </a:schemeClr>
+            </a:solidFill>
+            <a:ln w="31750">
+              <a:solidFill>
+                <a:srgbClr val="00B050"/>
+              </a:solidFill>
+            </a:ln>
+          </p:spPr>
+          <p:style>
+            <a:lnRef idx="2">
+              <a:schemeClr val="accent1">
+                <a:shade val="50000"/>
+              </a:schemeClr>
+            </a:lnRef>
+            <a:fillRef idx="1">
+              <a:schemeClr val="accent1"/>
+            </a:fillRef>
+            <a:effectRef idx="0">
+              <a:schemeClr val="accent1"/>
+            </a:effectRef>
+            <a:fontRef idx="minor">
+              <a:schemeClr val="lt1"/>
+            </a:fontRef>
+          </p:style>
+          <p:txBody>
+            <a:bodyPr rtlCol="0" anchor="ctr"/>
+            <a:lstStyle/>
+            <a:p>
+              <a:pPr algn="ctr"/>
+              <a:endParaRPr lang="en-US"/>
+            </a:p>
+          </p:txBody>
+        </p:sp>
+        <p:sp>
+          <p:nvSpPr>
+            <p:cNvPr id="38" name="Rectangle: Rounded Corners 37"/>
+            <p:cNvSpPr/>
+            <p:nvPr/>
+          </p:nvSpPr>
+          <p:spPr>
+            <a:xfrm rot="5400000">
+              <a:off x="691692" y="4120654"/>
+              <a:ext cx="1431197" cy="296243"/>
+            </a:xfrm>
+            <a:prstGeom prst="roundRect">
+              <a:avLst/>
+            </a:prstGeom>
+            <a:solidFill>
+              <a:schemeClr val="tx1">
+                <a:lumMod val="75000"/>
+                <a:lumOff val="25000"/>
+              </a:schemeClr>
+            </a:solidFill>
+            <a:ln w="31750">
+              <a:solidFill>
+                <a:srgbClr val="00B050"/>
+              </a:solidFill>
+            </a:ln>
+          </p:spPr>
+          <p:style>
+            <a:lnRef idx="2">
+              <a:schemeClr val="accent1">
+                <a:shade val="50000"/>
+              </a:schemeClr>
+            </a:lnRef>
+            <a:fillRef idx="1">
+              <a:schemeClr val="accent1"/>
+            </a:fillRef>
+            <a:effectRef idx="0">
+              <a:schemeClr val="accent1"/>
+            </a:effectRef>
+            <a:fontRef idx="minor">
+              <a:schemeClr val="lt1"/>
+            </a:fontRef>
+          </p:style>
+          <p:txBody>
+            <a:bodyPr rtlCol="0" anchor="ctr"/>
+            <a:lstStyle/>
+            <a:p>
+              <a:pPr algn="ctr"/>
+              <a:endParaRPr lang="en-US"/>
+            </a:p>
+          </p:txBody>
+        </p:sp>
+        <p:sp>
+          <p:nvSpPr>
+            <p:cNvPr id="39" name="Rectangle: Rounded Corners 38"/>
+            <p:cNvSpPr/>
+            <p:nvPr/>
+          </p:nvSpPr>
+          <p:spPr>
+            <a:xfrm>
+              <a:off x="390379" y="3282269"/>
+              <a:ext cx="2033822" cy="259977"/>
+            </a:xfrm>
+            <a:prstGeom prst="roundRect">
+              <a:avLst/>
+            </a:prstGeom>
+            <a:solidFill>
+              <a:schemeClr val="tx1">
+                <a:lumMod val="75000"/>
+                <a:lumOff val="25000"/>
+              </a:schemeClr>
+            </a:solidFill>
+            <a:ln w="31750">
+              <a:solidFill>
+                <a:srgbClr val="00B050"/>
+              </a:solidFill>
+            </a:ln>
+          </p:spPr>
+          <p:style>
+            <a:lnRef idx="2">
+              <a:schemeClr val="accent1">
+                <a:shade val="50000"/>
+              </a:schemeClr>
+            </a:lnRef>
+            <a:fillRef idx="1">
+              <a:schemeClr val="accent1"/>
+            </a:fillRef>
+            <a:effectRef idx="0">
+              <a:schemeClr val="accent1"/>
+            </a:effectRef>
+            <a:fontRef idx="minor">
+              <a:schemeClr val="lt1"/>
+            </a:fontRef>
+          </p:style>
+          <p:txBody>
+            <a:bodyPr rtlCol="0" anchor="ctr"/>
+            <a:lstStyle/>
+            <a:p>
+              <a:pPr algn="ctr"/>
+              <a:endParaRPr lang="en-US"/>
             </a:p>
           </p:txBody>
         </p:sp>

</xml_diff>